<commit_message>
Cracking the Data Science Interview
</commit_message>
<xml_diff>
--- a/Webinar/35 UpGrad - Cracking the Data Science Interview/Cracking the Data Science Interview.pptx
+++ b/Webinar/35 UpGrad - Cracking the Data Science Interview/Cracking the Data Science Interview.pptx
@@ -279,7 +279,7 @@
           <a:p>
             <a:fld id="{FEC1E092-1ED1-4761-85D1-EEE54D1D70F3}" type="datetimeFigureOut">
               <a:rPr lang="en-US" smtClean="0"/>
-              <a:t>5/8/23</a:t>
+              <a:t>5/9/23</a:t>
             </a:fld>
             <a:endParaRPr lang="en-US" dirty="0"/>
           </a:p>
@@ -1913,7 +1913,7 @@
             <a:fld id="{93B45646-DC20-4B9A-BA6C-96B87E2ABB20}" type="datetimeFigureOut">
               <a:rPr lang="en-US" smtClean="0"/>
               <a:pPr/>
-              <a:t>5/8/23</a:t>
+              <a:t>5/9/23</a:t>
             </a:fld>
             <a:endParaRPr lang="en-US" dirty="0"/>
           </a:p>
@@ -2212,7 +2212,7 @@
             <a:fld id="{93B45646-DC20-4B9A-BA6C-96B87E2ABB20}" type="datetimeFigureOut">
               <a:rPr lang="en-US" smtClean="0"/>
               <a:pPr/>
-              <a:t>5/8/23</a:t>
+              <a:t>5/9/23</a:t>
             </a:fld>
             <a:endParaRPr lang="en-US" dirty="0"/>
           </a:p>
@@ -2545,7 +2545,7 @@
             <a:fld id="{93B45646-DC20-4B9A-BA6C-96B87E2ABB20}" type="datetimeFigureOut">
               <a:rPr lang="en-US" smtClean="0"/>
               <a:pPr/>
-              <a:t>5/8/23</a:t>
+              <a:t>5/9/23</a:t>
             </a:fld>
             <a:endParaRPr lang="en-US" dirty="0"/>
           </a:p>
@@ -2940,7 +2940,7 @@
             <a:fld id="{93B45646-DC20-4B9A-BA6C-96B87E2ABB20}" type="datetimeFigureOut">
               <a:rPr lang="en-US" smtClean="0"/>
               <a:pPr/>
-              <a:t>5/8/23</a:t>
+              <a:t>5/9/23</a:t>
             </a:fld>
             <a:endParaRPr lang="en-US" dirty="0"/>
           </a:p>
@@ -3489,7 +3489,7 @@
             <a:fld id="{93B45646-DC20-4B9A-BA6C-96B87E2ABB20}" type="datetimeFigureOut">
               <a:rPr lang="en-US" smtClean="0"/>
               <a:pPr/>
-              <a:t>5/8/23</a:t>
+              <a:t>5/9/23</a:t>
             </a:fld>
             <a:endParaRPr lang="en-US" dirty="0"/>
           </a:p>
@@ -3692,7 +3692,7 @@
             <a:fld id="{93B45646-DC20-4B9A-BA6C-96B87E2ABB20}" type="datetimeFigureOut">
               <a:rPr lang="en-US" smtClean="0"/>
               <a:pPr/>
-              <a:t>5/8/23</a:t>
+              <a:t>5/9/23</a:t>
             </a:fld>
             <a:endParaRPr lang="en-US" dirty="0"/>
           </a:p>
@@ -3852,7 +3852,7 @@
             <a:fld id="{93B45646-DC20-4B9A-BA6C-96B87E2ABB20}" type="datetimeFigureOut">
               <a:rPr lang="en-US" smtClean="0"/>
               <a:pPr/>
-              <a:t>5/8/23</a:t>
+              <a:t>5/9/23</a:t>
             </a:fld>
             <a:endParaRPr lang="en-US" dirty="0"/>
           </a:p>
@@ -13674,10 +13674,10 @@
         </p:nvGrpSpPr>
         <p:grpSpPr>
           <a:xfrm>
-            <a:off x="1176300" y="2783942"/>
-            <a:ext cx="2744525" cy="853545"/>
-            <a:chOff x="863323" y="1992704"/>
-            <a:chExt cx="2058394" cy="640158"/>
+            <a:off x="990101" y="2783943"/>
+            <a:ext cx="3116920" cy="662421"/>
+            <a:chOff x="723674" y="1992704"/>
+            <a:chExt cx="2337690" cy="496815"/>
           </a:xfrm>
         </p:grpSpPr>
         <p:sp>
@@ -13736,8 +13736,8 @@
           </p:nvSpPr>
           <p:spPr>
             <a:xfrm>
-              <a:off x="863323" y="2171342"/>
-              <a:ext cx="2058394" cy="461520"/>
+              <a:off x="723674" y="2181839"/>
+              <a:ext cx="2337690" cy="307680"/>
             </a:xfrm>
             <a:prstGeom prst="rect">
               <a:avLst/>
@@ -13787,10 +13787,10 @@
         </p:nvGrpSpPr>
         <p:grpSpPr>
           <a:xfrm>
-            <a:off x="4749136" y="2783942"/>
-            <a:ext cx="2744525" cy="853544"/>
-            <a:chOff x="3542950" y="1992705"/>
-            <a:chExt cx="2058394" cy="640158"/>
+            <a:off x="4428077" y="2783941"/>
+            <a:ext cx="3335845" cy="662421"/>
+            <a:chOff x="3302156" y="1992705"/>
+            <a:chExt cx="2501884" cy="496816"/>
           </a:xfrm>
         </p:grpSpPr>
         <p:sp>
@@ -13849,8 +13849,8 @@
           </p:nvSpPr>
           <p:spPr>
             <a:xfrm>
-              <a:off x="3542950" y="2171342"/>
-              <a:ext cx="2058394" cy="461521"/>
+              <a:off x="3302156" y="2181840"/>
+              <a:ext cx="2501884" cy="307681"/>
             </a:xfrm>
             <a:prstGeom prst="rect">
               <a:avLst/>
@@ -13900,10 +13900,10 @@
         </p:nvGrpSpPr>
         <p:grpSpPr>
           <a:xfrm>
-            <a:off x="8321973" y="2783940"/>
-            <a:ext cx="2744525" cy="1058664"/>
+            <a:off x="8321972" y="2783940"/>
+            <a:ext cx="2879926" cy="853544"/>
             <a:chOff x="6222578" y="1992705"/>
-            <a:chExt cx="2058394" cy="793998"/>
+            <a:chExt cx="2159945" cy="640158"/>
           </a:xfrm>
         </p:grpSpPr>
         <p:sp>
@@ -13963,7 +13963,7 @@
           <p:spPr>
             <a:xfrm>
               <a:off x="6222578" y="2171342"/>
-              <a:ext cx="2058394" cy="615361"/>
+              <a:ext cx="2159945" cy="461521"/>
             </a:xfrm>
             <a:prstGeom prst="rect">
               <a:avLst/>
@@ -14013,10 +14013,10 @@
         </p:nvGrpSpPr>
         <p:grpSpPr>
           <a:xfrm>
-            <a:off x="4749136" y="5408808"/>
-            <a:ext cx="2744525" cy="1058664"/>
-            <a:chOff x="863323" y="3720915"/>
-            <a:chExt cx="2058394" cy="793998"/>
+            <a:off x="4467279" y="5408808"/>
+            <a:ext cx="3257440" cy="853544"/>
+            <a:chOff x="651930" y="3720915"/>
+            <a:chExt cx="2443080" cy="640158"/>
           </a:xfrm>
         </p:grpSpPr>
         <p:sp>
@@ -14075,8 +14075,8 @@
           </p:nvSpPr>
           <p:spPr>
             <a:xfrm>
-              <a:off x="863323" y="3899552"/>
-              <a:ext cx="2058394" cy="615361"/>
+              <a:off x="651930" y="3899552"/>
+              <a:ext cx="2443080" cy="461521"/>
             </a:xfrm>
             <a:prstGeom prst="rect">
               <a:avLst/>

</xml_diff>